<commit_message>
Add components directives and pipes section
</commit_message>
<xml_diff>
--- a/1ATypeScript/ts.pptx
+++ b/1ATypeScript/ts.pptx
@@ -12,6 +12,9 @@
     <p:sldId id="260" r:id="rId6"/>
     <p:sldId id="262" r:id="rId7"/>
     <p:sldId id="261" r:id="rId8"/>
+    <p:sldId id="263" r:id="rId9"/>
+    <p:sldId id="264" r:id="rId10"/>
+    <p:sldId id="265" r:id="rId11"/>
   </p:sldIdLst>
   <p:sldSz cx="12192000" cy="6858000"/>
   <p:notesSz cx="6858000" cy="9144000"/>
@@ -247,7 +250,7 @@
           <a:p>
             <a:fld id="{D5279824-C717-4B52-9E7D-7B6B13CAFE89}" type="datetimeFigureOut">
               <a:rPr lang="en-US" smtClean="0"/>
-              <a:t>10/5/2016</a:t>
+              <a:t>10/9/2016</a:t>
             </a:fld>
             <a:endParaRPr lang="en-US"/>
           </a:p>
@@ -415,7 +418,7 @@
           <a:p>
             <a:fld id="{D5279824-C717-4B52-9E7D-7B6B13CAFE89}" type="datetimeFigureOut">
               <a:rPr lang="en-US" smtClean="0"/>
-              <a:t>10/5/2016</a:t>
+              <a:t>10/9/2016</a:t>
             </a:fld>
             <a:endParaRPr lang="en-US"/>
           </a:p>
@@ -593,7 +596,7 @@
           <a:p>
             <a:fld id="{D5279824-C717-4B52-9E7D-7B6B13CAFE89}" type="datetimeFigureOut">
               <a:rPr lang="en-US" smtClean="0"/>
-              <a:t>10/5/2016</a:t>
+              <a:t>10/9/2016</a:t>
             </a:fld>
             <a:endParaRPr lang="en-US"/>
           </a:p>
@@ -761,7 +764,7 @@
           <a:p>
             <a:fld id="{D5279824-C717-4B52-9E7D-7B6B13CAFE89}" type="datetimeFigureOut">
               <a:rPr lang="en-US" smtClean="0"/>
-              <a:t>10/5/2016</a:t>
+              <a:t>10/9/2016</a:t>
             </a:fld>
             <a:endParaRPr lang="en-US"/>
           </a:p>
@@ -1006,7 +1009,7 @@
           <a:p>
             <a:fld id="{D5279824-C717-4B52-9E7D-7B6B13CAFE89}" type="datetimeFigureOut">
               <a:rPr lang="en-US" smtClean="0"/>
-              <a:t>10/5/2016</a:t>
+              <a:t>10/9/2016</a:t>
             </a:fld>
             <a:endParaRPr lang="en-US"/>
           </a:p>
@@ -1235,7 +1238,7 @@
           <a:p>
             <a:fld id="{D5279824-C717-4B52-9E7D-7B6B13CAFE89}" type="datetimeFigureOut">
               <a:rPr lang="en-US" smtClean="0"/>
-              <a:t>10/5/2016</a:t>
+              <a:t>10/9/2016</a:t>
             </a:fld>
             <a:endParaRPr lang="en-US"/>
           </a:p>
@@ -1599,7 +1602,7 @@
           <a:p>
             <a:fld id="{D5279824-C717-4B52-9E7D-7B6B13CAFE89}" type="datetimeFigureOut">
               <a:rPr lang="en-US" smtClean="0"/>
-              <a:t>10/5/2016</a:t>
+              <a:t>10/9/2016</a:t>
             </a:fld>
             <a:endParaRPr lang="en-US"/>
           </a:p>
@@ -1716,7 +1719,7 @@
           <a:p>
             <a:fld id="{D5279824-C717-4B52-9E7D-7B6B13CAFE89}" type="datetimeFigureOut">
               <a:rPr lang="en-US" smtClean="0"/>
-              <a:t>10/5/2016</a:t>
+              <a:t>10/9/2016</a:t>
             </a:fld>
             <a:endParaRPr lang="en-US"/>
           </a:p>
@@ -1811,7 +1814,7 @@
           <a:p>
             <a:fld id="{D5279824-C717-4B52-9E7D-7B6B13CAFE89}" type="datetimeFigureOut">
               <a:rPr lang="en-US" smtClean="0"/>
-              <a:t>10/5/2016</a:t>
+              <a:t>10/9/2016</a:t>
             </a:fld>
             <a:endParaRPr lang="en-US"/>
           </a:p>
@@ -2086,7 +2089,7 @@
           <a:p>
             <a:fld id="{D5279824-C717-4B52-9E7D-7B6B13CAFE89}" type="datetimeFigureOut">
               <a:rPr lang="en-US" smtClean="0"/>
-              <a:t>10/5/2016</a:t>
+              <a:t>10/9/2016</a:t>
             </a:fld>
             <a:endParaRPr lang="en-US"/>
           </a:p>
@@ -2338,7 +2341,7 @@
           <a:p>
             <a:fld id="{D5279824-C717-4B52-9E7D-7B6B13CAFE89}" type="datetimeFigureOut">
               <a:rPr lang="en-US" smtClean="0"/>
-              <a:t>10/5/2016</a:t>
+              <a:t>10/9/2016</a:t>
             </a:fld>
             <a:endParaRPr lang="en-US"/>
           </a:p>
@@ -2549,7 +2552,7 @@
           <a:p>
             <a:fld id="{D5279824-C717-4B52-9E7D-7B6B13CAFE89}" type="datetimeFigureOut">
               <a:rPr lang="en-US" smtClean="0"/>
-              <a:t>10/5/2016</a:t>
+              <a:t>10/9/2016</a:t>
             </a:fld>
             <a:endParaRPr lang="en-US"/>
           </a:p>
@@ -3017,6 +3020,111 @@
 </p:sld>
 </file>
 
+<file path=ppt/slides/slide10.xml><?xml version="1.0" encoding="utf-8"?>
+<p:sld xmlns:a="http://schemas.openxmlformats.org/drawingml/2006/main" xmlns:r="http://schemas.openxmlformats.org/officeDocument/2006/relationships" xmlns:p="http://schemas.openxmlformats.org/presentationml/2006/main">
+  <p:cSld>
+    <p:spTree>
+      <p:nvGrpSpPr>
+        <p:cNvPr id="1" name=""/>
+        <p:cNvGrpSpPr/>
+        <p:nvPr/>
+      </p:nvGrpSpPr>
+      <p:grpSpPr>
+        <a:xfrm>
+          <a:off x="0" y="0"/>
+          <a:ext cx="0" cy="0"/>
+          <a:chOff x="0" y="0"/>
+          <a:chExt cx="0" cy="0"/>
+        </a:xfrm>
+      </p:grpSpPr>
+      <p:sp>
+        <p:nvSpPr>
+          <p:cNvPr id="2" name="Title 1"/>
+          <p:cNvSpPr>
+            <a:spLocks noGrp="1"/>
+          </p:cNvSpPr>
+          <p:nvPr>
+            <p:ph type="title"/>
+          </p:nvPr>
+        </p:nvSpPr>
+        <p:spPr/>
+        <p:txBody>
+          <a:bodyPr/>
+          <a:lstStyle/>
+          <a:p>
+            <a:r>
+              <a:rPr lang="en-US" dirty="0"/>
+              <a:t>The Real World</a:t>
+            </a:r>
+          </a:p>
+        </p:txBody>
+      </p:sp>
+      <p:sp>
+        <p:nvSpPr>
+          <p:cNvPr id="3" name="Content Placeholder 2"/>
+          <p:cNvSpPr>
+            <a:spLocks noGrp="1"/>
+          </p:cNvSpPr>
+          <p:nvPr>
+            <p:ph idx="1"/>
+          </p:nvPr>
+        </p:nvSpPr>
+        <p:spPr/>
+        <p:txBody>
+          <a:bodyPr/>
+          <a:lstStyle/>
+          <a:p>
+            <a:r>
+              <a:rPr lang="en-US" dirty="0"/>
+              <a:t>Library definitions (definitely typed a-la </a:t>
+            </a:r>
+            <a:r>
+              <a:rPr lang="en-US" dirty="0" err="1">
+                <a:solidFill>
+                  <a:srgbClr val="FFC000"/>
+                </a:solidFill>
+                <a:latin typeface="Consolas" panose="020B0609020204030204" pitchFamily="49" charset="0"/>
+              </a:rPr>
+              <a:t>typings</a:t>
+            </a:r>
+            <a:r>
+              <a:rPr lang="en-US" dirty="0"/>
+              <a:t>)</a:t>
+            </a:r>
+          </a:p>
+          <a:p>
+            <a:r>
+              <a:rPr lang="en-US" dirty="0"/>
+              <a:t>Migrating JavaScript </a:t>
+            </a:r>
+          </a:p>
+          <a:p>
+            <a:r>
+              <a:rPr lang="en-US" dirty="0"/>
+              <a:t>Compiler Options</a:t>
+            </a:r>
+          </a:p>
+          <a:p>
+            <a:r>
+              <a:rPr lang="en-US" dirty="0"/>
+              <a:t>AMD</a:t>
+            </a:r>
+          </a:p>
+        </p:txBody>
+      </p:sp>
+    </p:spTree>
+    <p:extLst>
+      <p:ext uri="{BB962C8B-B14F-4D97-AF65-F5344CB8AC3E}">
+        <p14:creationId xmlns:p14="http://schemas.microsoft.com/office/powerpoint/2010/main" val="1026106702"/>
+      </p:ext>
+    </p:extLst>
+  </p:cSld>
+  <p:clrMapOvr>
+    <a:masterClrMapping/>
+  </p:clrMapOvr>
+</p:sld>
+</file>
+
 <file path=ppt/slides/slide2.xml><?xml version="1.0" encoding="utf-8"?>
 <p:sld xmlns:a="http://schemas.openxmlformats.org/drawingml/2006/main" xmlns:r="http://schemas.openxmlformats.org/officeDocument/2006/relationships" xmlns:p="http://schemas.openxmlformats.org/presentationml/2006/main">
   <p:cSld>
@@ -4010,6 +4118,248 @@
     <p:extLst>
       <p:ext uri="{BB962C8B-B14F-4D97-AF65-F5344CB8AC3E}">
         <p14:creationId xmlns:p14="http://schemas.microsoft.com/office/powerpoint/2010/main" val="1179847345"/>
+      </p:ext>
+    </p:extLst>
+  </p:cSld>
+  <p:clrMapOvr>
+    <a:masterClrMapping/>
+  </p:clrMapOvr>
+</p:sld>
+</file>
+
+<file path=ppt/slides/slide8.xml><?xml version="1.0" encoding="utf-8"?>
+<p:sld xmlns:a="http://schemas.openxmlformats.org/drawingml/2006/main" xmlns:r="http://schemas.openxmlformats.org/officeDocument/2006/relationships" xmlns:p="http://schemas.openxmlformats.org/presentationml/2006/main">
+  <p:cSld>
+    <p:spTree>
+      <p:nvGrpSpPr>
+        <p:cNvPr id="1" name=""/>
+        <p:cNvGrpSpPr/>
+        <p:nvPr/>
+      </p:nvGrpSpPr>
+      <p:grpSpPr>
+        <a:xfrm>
+          <a:off x="0" y="0"/>
+          <a:ext cx="0" cy="0"/>
+          <a:chOff x="0" y="0"/>
+          <a:chExt cx="0" cy="0"/>
+        </a:xfrm>
+      </p:grpSpPr>
+      <p:sp>
+        <p:nvSpPr>
+          <p:cNvPr id="2" name="Title 1"/>
+          <p:cNvSpPr>
+            <a:spLocks noGrp="1"/>
+          </p:cNvSpPr>
+          <p:nvPr>
+            <p:ph type="title"/>
+          </p:nvPr>
+        </p:nvSpPr>
+        <p:spPr/>
+        <p:txBody>
+          <a:bodyPr/>
+          <a:lstStyle/>
+          <a:p>
+            <a:r>
+              <a:rPr lang="en-US" dirty="0"/>
+              <a:t>The Basics</a:t>
+            </a:r>
+          </a:p>
+        </p:txBody>
+      </p:sp>
+      <p:sp>
+        <p:nvSpPr>
+          <p:cNvPr id="4" name="Content Placeholder 3"/>
+          <p:cNvSpPr>
+            <a:spLocks noGrp="1"/>
+          </p:cNvSpPr>
+          <p:nvPr>
+            <p:ph idx="1"/>
+          </p:nvPr>
+        </p:nvSpPr>
+        <p:spPr/>
+        <p:txBody>
+          <a:bodyPr/>
+          <a:lstStyle/>
+          <a:p>
+            <a:pPr marL="342900" indent="-342900">
+              <a:buFont typeface="Arial" panose="020B0604020202020204" pitchFamily="34" charset="0"/>
+              <a:buChar char="•"/>
+            </a:pPr>
+            <a:r>
+              <a:rPr lang="en-US" dirty="0"/>
+              <a:t>Types</a:t>
+            </a:r>
+          </a:p>
+          <a:p>
+            <a:pPr marL="342900" indent="-342900">
+              <a:buFont typeface="Arial" panose="020B0604020202020204" pitchFamily="34" charset="0"/>
+              <a:buChar char="•"/>
+            </a:pPr>
+            <a:r>
+              <a:rPr lang="en-US" dirty="0"/>
+              <a:t>Interfaces</a:t>
+            </a:r>
+          </a:p>
+          <a:p>
+            <a:pPr marL="342900" indent="-342900">
+              <a:buFont typeface="Arial" panose="020B0604020202020204" pitchFamily="34" charset="0"/>
+              <a:buChar char="•"/>
+            </a:pPr>
+            <a:r>
+              <a:rPr lang="en-US" dirty="0"/>
+              <a:t>Classes</a:t>
+            </a:r>
+          </a:p>
+          <a:p>
+            <a:pPr marL="342900" indent="-342900">
+              <a:buFont typeface="Arial" panose="020B0604020202020204" pitchFamily="34" charset="0"/>
+              <a:buChar char="•"/>
+            </a:pPr>
+            <a:r>
+              <a:rPr lang="en-US" dirty="0"/>
+              <a:t>Modules</a:t>
+            </a:r>
+          </a:p>
+          <a:p>
+            <a:pPr marL="342900" indent="-342900">
+              <a:buFont typeface="Arial" panose="020B0604020202020204" pitchFamily="34" charset="0"/>
+              <a:buChar char="•"/>
+            </a:pPr>
+            <a:endParaRPr lang="en-US" dirty="0"/>
+          </a:p>
+          <a:p>
+            <a:pPr marL="0" indent="0">
+              <a:buNone/>
+            </a:pPr>
+            <a:r>
+              <a:rPr lang="en-US" dirty="0"/>
+              <a:t>Run lab steps through 12b </a:t>
+            </a:r>
+          </a:p>
+        </p:txBody>
+      </p:sp>
+    </p:spTree>
+    <p:extLst>
+      <p:ext uri="{BB962C8B-B14F-4D97-AF65-F5344CB8AC3E}">
+        <p14:creationId xmlns:p14="http://schemas.microsoft.com/office/powerpoint/2010/main" val="4009056720"/>
+      </p:ext>
+    </p:extLst>
+  </p:cSld>
+  <p:clrMapOvr>
+    <a:masterClrMapping/>
+  </p:clrMapOvr>
+</p:sld>
+</file>
+
+<file path=ppt/slides/slide9.xml><?xml version="1.0" encoding="utf-8"?>
+<p:sld xmlns:a="http://schemas.openxmlformats.org/drawingml/2006/main" xmlns:r="http://schemas.openxmlformats.org/officeDocument/2006/relationships" xmlns:p="http://schemas.openxmlformats.org/presentationml/2006/main">
+  <p:cSld>
+    <p:spTree>
+      <p:nvGrpSpPr>
+        <p:cNvPr id="1" name=""/>
+        <p:cNvGrpSpPr/>
+        <p:nvPr/>
+      </p:nvGrpSpPr>
+      <p:grpSpPr>
+        <a:xfrm>
+          <a:off x="0" y="0"/>
+          <a:ext cx="0" cy="0"/>
+          <a:chOff x="0" y="0"/>
+          <a:chExt cx="0" cy="0"/>
+        </a:xfrm>
+      </p:grpSpPr>
+      <p:sp>
+        <p:nvSpPr>
+          <p:cNvPr id="2" name="Title 1"/>
+          <p:cNvSpPr>
+            <a:spLocks noGrp="1"/>
+          </p:cNvSpPr>
+          <p:nvPr>
+            <p:ph type="title"/>
+          </p:nvPr>
+        </p:nvSpPr>
+        <p:spPr/>
+        <p:txBody>
+          <a:bodyPr/>
+          <a:lstStyle/>
+          <a:p>
+            <a:r>
+              <a:rPr lang="en-US" dirty="0"/>
+              <a:t>The Cool Stuff	</a:t>
+            </a:r>
+          </a:p>
+        </p:txBody>
+      </p:sp>
+      <p:sp>
+        <p:nvSpPr>
+          <p:cNvPr id="3" name="Content Placeholder 2"/>
+          <p:cNvSpPr>
+            <a:spLocks noGrp="1"/>
+          </p:cNvSpPr>
+          <p:nvPr>
+            <p:ph idx="1"/>
+          </p:nvPr>
+        </p:nvSpPr>
+        <p:spPr/>
+        <p:txBody>
+          <a:bodyPr/>
+          <a:lstStyle/>
+          <a:p>
+            <a:pPr marL="342900" indent="-342900"/>
+            <a:r>
+              <a:rPr lang="en-US" dirty="0"/>
+              <a:t>Functions and Lambdas </a:t>
+            </a:r>
+          </a:p>
+          <a:p>
+            <a:pPr marL="342900" indent="-342900"/>
+            <a:r>
+              <a:rPr lang="en-US" dirty="0"/>
+              <a:t>Complex Type Definitions</a:t>
+            </a:r>
+          </a:p>
+          <a:p>
+            <a:pPr marL="342900" indent="-342900"/>
+            <a:r>
+              <a:rPr lang="en-US" dirty="0"/>
+              <a:t>Generics</a:t>
+            </a:r>
+          </a:p>
+          <a:p>
+            <a:pPr marL="342900" indent="-342900"/>
+            <a:r>
+              <a:rPr lang="en-US" dirty="0" err="1"/>
+              <a:t>Mixins</a:t>
+            </a:r>
+            <a:r>
+              <a:rPr lang="en-US" dirty="0"/>
+              <a:t> and Decorators</a:t>
+            </a:r>
+          </a:p>
+          <a:p>
+            <a:endParaRPr lang="en-US" dirty="0"/>
+          </a:p>
+          <a:p>
+            <a:pPr marL="0" indent="0">
+              <a:buNone/>
+            </a:pPr>
+            <a:r>
+              <a:rPr lang="en-US" dirty="0"/>
+              <a:t>Run lab steps 12c – 13 </a:t>
+            </a:r>
+          </a:p>
+          <a:p>
+            <a:pPr marL="0" indent="0">
+              <a:buNone/>
+            </a:pPr>
+            <a:endParaRPr lang="en-US" dirty="0"/>
+          </a:p>
+        </p:txBody>
+      </p:sp>
+    </p:spTree>
+    <p:extLst>
+      <p:ext uri="{BB962C8B-B14F-4D97-AF65-F5344CB8AC3E}">
+        <p14:creationId xmlns:p14="http://schemas.microsoft.com/office/powerpoint/2010/main" val="1693049020"/>
       </p:ext>
     </p:extLst>
   </p:cSld>

</xml_diff>